<commit_message>
Added introduction to the presentation
</commit_message>
<xml_diff>
--- a/C4G2015Presentation.pptx
+++ b/C4G2015Presentation.pptx
@@ -4,8 +4,12 @@
   <p:sldMasterIdLst>
     <p:sldMasterId id="2147483696" r:id="rId1"/>
   </p:sldMasterIdLst>
+  <p:notesMasterIdLst>
+    <p:notesMasterId r:id="rId4"/>
+  </p:notesMasterIdLst>
   <p:sldIdLst>
     <p:sldId id="256" r:id="rId2"/>
+    <p:sldId id="257" r:id="rId3"/>
   </p:sldIdLst>
   <p:sldSz cx="12192000" cy="6858000"/>
   <p:notesSz cx="6858000" cy="9144000"/>
@@ -105,6 +109,485 @@
     </a:lvl9pPr>
   </p:defaultTextStyle>
 </p:presentation>
+</file>
+
+<file path=ppt/notesMasters/notesMaster1.xml><?xml version="1.0" encoding="utf-8"?>
+<p:notesMaster xmlns:a="http://schemas.openxmlformats.org/drawingml/2006/main" xmlns:r="http://schemas.openxmlformats.org/officeDocument/2006/relationships" xmlns:p="http://schemas.openxmlformats.org/presentationml/2006/main">
+  <p:cSld>
+    <p:bg>
+      <p:bgRef idx="1001">
+        <a:schemeClr val="bg1"/>
+      </p:bgRef>
+    </p:bg>
+    <p:spTree>
+      <p:nvGrpSpPr>
+        <p:cNvPr id="1" name=""/>
+        <p:cNvGrpSpPr/>
+        <p:nvPr/>
+      </p:nvGrpSpPr>
+      <p:grpSpPr>
+        <a:xfrm>
+          <a:off x="0" y="0"/>
+          <a:ext cx="0" cy="0"/>
+          <a:chOff x="0" y="0"/>
+          <a:chExt cx="0" cy="0"/>
+        </a:xfrm>
+      </p:grpSpPr>
+      <p:sp>
+        <p:nvSpPr>
+          <p:cNvPr id="2" name="Header Placeholder 1"/>
+          <p:cNvSpPr>
+            <a:spLocks noGrp="1"/>
+          </p:cNvSpPr>
+          <p:nvPr>
+            <p:ph type="hdr" sz="quarter"/>
+          </p:nvPr>
+        </p:nvSpPr>
+        <p:spPr>
+          <a:xfrm>
+            <a:off x="0" y="0"/>
+            <a:ext cx="2971800" cy="458788"/>
+          </a:xfrm>
+          <a:prstGeom prst="rect">
+            <a:avLst/>
+          </a:prstGeom>
+        </p:spPr>
+        <p:txBody>
+          <a:bodyPr vert="horz" lIns="91440" tIns="45720" rIns="91440" bIns="45720" rtlCol="0"/>
+          <a:lstStyle>
+            <a:lvl1pPr algn="l">
+              <a:defRPr sz="1200"/>
+            </a:lvl1pPr>
+          </a:lstStyle>
+          <a:p>
+            <a:endParaRPr lang="en-GB"/>
+          </a:p>
+        </p:txBody>
+      </p:sp>
+      <p:sp>
+        <p:nvSpPr>
+          <p:cNvPr id="3" name="Date Placeholder 2"/>
+          <p:cNvSpPr>
+            <a:spLocks noGrp="1"/>
+          </p:cNvSpPr>
+          <p:nvPr>
+            <p:ph type="dt" idx="1"/>
+          </p:nvPr>
+        </p:nvSpPr>
+        <p:spPr>
+          <a:xfrm>
+            <a:off x="3884613" y="0"/>
+            <a:ext cx="2971800" cy="458788"/>
+          </a:xfrm>
+          <a:prstGeom prst="rect">
+            <a:avLst/>
+          </a:prstGeom>
+        </p:spPr>
+        <p:txBody>
+          <a:bodyPr vert="horz" lIns="91440" tIns="45720" rIns="91440" bIns="45720" rtlCol="0"/>
+          <a:lstStyle>
+            <a:lvl1pPr algn="r">
+              <a:defRPr sz="1200"/>
+            </a:lvl1pPr>
+          </a:lstStyle>
+          <a:p>
+            <a:fld id="{C88ED246-00EB-4532-A4B3-40BACBFCBD2E}" type="datetimeFigureOut">
+              <a:rPr lang="en-GB" smtClean="0"/>
+              <a:t>07/11/2015</a:t>
+            </a:fld>
+            <a:endParaRPr lang="en-GB"/>
+          </a:p>
+        </p:txBody>
+      </p:sp>
+      <p:sp>
+        <p:nvSpPr>
+          <p:cNvPr id="4" name="Slide Image Placeholder 3"/>
+          <p:cNvSpPr>
+            <a:spLocks noGrp="1" noRot="1" noChangeAspect="1"/>
+          </p:cNvSpPr>
+          <p:nvPr>
+            <p:ph type="sldImg" idx="2"/>
+          </p:nvPr>
+        </p:nvSpPr>
+        <p:spPr>
+          <a:xfrm>
+            <a:off x="685800" y="1143000"/>
+            <a:ext cx="5486400" cy="3086100"/>
+          </a:xfrm>
+          <a:prstGeom prst="rect">
+            <a:avLst/>
+          </a:prstGeom>
+          <a:noFill/>
+          <a:ln w="12700">
+            <a:solidFill>
+              <a:prstClr val="black"/>
+            </a:solidFill>
+          </a:ln>
+        </p:spPr>
+        <p:txBody>
+          <a:bodyPr vert="horz" lIns="91440" tIns="45720" rIns="91440" bIns="45720" rtlCol="0" anchor="ctr"/>
+          <a:lstStyle/>
+          <a:p>
+            <a:endParaRPr lang="en-GB"/>
+          </a:p>
+        </p:txBody>
+      </p:sp>
+      <p:sp>
+        <p:nvSpPr>
+          <p:cNvPr id="5" name="Notes Placeholder 4"/>
+          <p:cNvSpPr>
+            <a:spLocks noGrp="1"/>
+          </p:cNvSpPr>
+          <p:nvPr>
+            <p:ph type="body" sz="quarter" idx="3"/>
+          </p:nvPr>
+        </p:nvSpPr>
+        <p:spPr>
+          <a:xfrm>
+            <a:off x="685800" y="4400550"/>
+            <a:ext cx="5486400" cy="3600450"/>
+          </a:xfrm>
+          <a:prstGeom prst="rect">
+            <a:avLst/>
+          </a:prstGeom>
+        </p:spPr>
+        <p:txBody>
+          <a:bodyPr vert="horz" lIns="91440" tIns="45720" rIns="91440" bIns="45720" rtlCol="0"/>
+          <a:lstStyle/>
+          <a:p>
+            <a:pPr lvl="0"/>
+            <a:r>
+              <a:rPr lang="en-US" smtClean="0"/>
+              <a:t>Click to edit Master text styles</a:t>
+            </a:r>
+          </a:p>
+          <a:p>
+            <a:pPr lvl="1"/>
+            <a:r>
+              <a:rPr lang="en-US" smtClean="0"/>
+              <a:t>Second level</a:t>
+            </a:r>
+          </a:p>
+          <a:p>
+            <a:pPr lvl="2"/>
+            <a:r>
+              <a:rPr lang="en-US" smtClean="0"/>
+              <a:t>Third level</a:t>
+            </a:r>
+          </a:p>
+          <a:p>
+            <a:pPr lvl="3"/>
+            <a:r>
+              <a:rPr lang="en-US" smtClean="0"/>
+              <a:t>Fourth level</a:t>
+            </a:r>
+          </a:p>
+          <a:p>
+            <a:pPr lvl="4"/>
+            <a:r>
+              <a:rPr lang="en-US" smtClean="0"/>
+              <a:t>Fifth level</a:t>
+            </a:r>
+            <a:endParaRPr lang="en-GB"/>
+          </a:p>
+        </p:txBody>
+      </p:sp>
+      <p:sp>
+        <p:nvSpPr>
+          <p:cNvPr id="6" name="Footer Placeholder 5"/>
+          <p:cNvSpPr>
+            <a:spLocks noGrp="1"/>
+          </p:cNvSpPr>
+          <p:nvPr>
+            <p:ph type="ftr" sz="quarter" idx="4"/>
+          </p:nvPr>
+        </p:nvSpPr>
+        <p:spPr>
+          <a:xfrm>
+            <a:off x="0" y="8685213"/>
+            <a:ext cx="2971800" cy="458787"/>
+          </a:xfrm>
+          <a:prstGeom prst="rect">
+            <a:avLst/>
+          </a:prstGeom>
+        </p:spPr>
+        <p:txBody>
+          <a:bodyPr vert="horz" lIns="91440" tIns="45720" rIns="91440" bIns="45720" rtlCol="0" anchor="b"/>
+          <a:lstStyle>
+            <a:lvl1pPr algn="l">
+              <a:defRPr sz="1200"/>
+            </a:lvl1pPr>
+          </a:lstStyle>
+          <a:p>
+            <a:endParaRPr lang="en-GB"/>
+          </a:p>
+        </p:txBody>
+      </p:sp>
+      <p:sp>
+        <p:nvSpPr>
+          <p:cNvPr id="7" name="Slide Number Placeholder 6"/>
+          <p:cNvSpPr>
+            <a:spLocks noGrp="1"/>
+          </p:cNvSpPr>
+          <p:nvPr>
+            <p:ph type="sldNum" sz="quarter" idx="5"/>
+          </p:nvPr>
+        </p:nvSpPr>
+        <p:spPr>
+          <a:xfrm>
+            <a:off x="3884613" y="8685213"/>
+            <a:ext cx="2971800" cy="458787"/>
+          </a:xfrm>
+          <a:prstGeom prst="rect">
+            <a:avLst/>
+          </a:prstGeom>
+        </p:spPr>
+        <p:txBody>
+          <a:bodyPr vert="horz" lIns="91440" tIns="45720" rIns="91440" bIns="45720" rtlCol="0" anchor="b"/>
+          <a:lstStyle>
+            <a:lvl1pPr algn="r">
+              <a:defRPr sz="1200"/>
+            </a:lvl1pPr>
+          </a:lstStyle>
+          <a:p>
+            <a:fld id="{0F0C9DE4-B42D-4D6E-AC3E-80271984D5FD}" type="slidenum">
+              <a:rPr lang="en-GB" smtClean="0"/>
+              <a:t>‹#›</a:t>
+            </a:fld>
+            <a:endParaRPr lang="en-GB"/>
+          </a:p>
+        </p:txBody>
+      </p:sp>
+    </p:spTree>
+    <p:extLst>
+      <p:ext uri="{BB962C8B-B14F-4D97-AF65-F5344CB8AC3E}">
+        <p14:creationId xmlns:p14="http://schemas.microsoft.com/office/powerpoint/2010/main" val="4165567817"/>
+      </p:ext>
+    </p:extLst>
+  </p:cSld>
+  <p:clrMap bg1="lt1" tx1="dk1" bg2="lt2" tx2="dk2" accent1="accent1" accent2="accent2" accent3="accent3" accent4="accent4" accent5="accent5" accent6="accent6" hlink="hlink" folHlink="folHlink"/>
+  <p:notesStyle>
+    <a:lvl1pPr marL="0" algn="l" defTabSz="914400" rtl="0" eaLnBrk="1" latinLnBrk="0" hangingPunct="1">
+      <a:defRPr sz="1200" kern="1200">
+        <a:solidFill>
+          <a:schemeClr val="tx1"/>
+        </a:solidFill>
+        <a:latin typeface="+mn-lt"/>
+        <a:ea typeface="+mn-ea"/>
+        <a:cs typeface="+mn-cs"/>
+      </a:defRPr>
+    </a:lvl1pPr>
+    <a:lvl2pPr marL="457200" algn="l" defTabSz="914400" rtl="0" eaLnBrk="1" latinLnBrk="0" hangingPunct="1">
+      <a:defRPr sz="1200" kern="1200">
+        <a:solidFill>
+          <a:schemeClr val="tx1"/>
+        </a:solidFill>
+        <a:latin typeface="+mn-lt"/>
+        <a:ea typeface="+mn-ea"/>
+        <a:cs typeface="+mn-cs"/>
+      </a:defRPr>
+    </a:lvl2pPr>
+    <a:lvl3pPr marL="914400" algn="l" defTabSz="914400" rtl="0" eaLnBrk="1" latinLnBrk="0" hangingPunct="1">
+      <a:defRPr sz="1200" kern="1200">
+        <a:solidFill>
+          <a:schemeClr val="tx1"/>
+        </a:solidFill>
+        <a:latin typeface="+mn-lt"/>
+        <a:ea typeface="+mn-ea"/>
+        <a:cs typeface="+mn-cs"/>
+      </a:defRPr>
+    </a:lvl3pPr>
+    <a:lvl4pPr marL="1371600" algn="l" defTabSz="914400" rtl="0" eaLnBrk="1" latinLnBrk="0" hangingPunct="1">
+      <a:defRPr sz="1200" kern="1200">
+        <a:solidFill>
+          <a:schemeClr val="tx1"/>
+        </a:solidFill>
+        <a:latin typeface="+mn-lt"/>
+        <a:ea typeface="+mn-ea"/>
+        <a:cs typeface="+mn-cs"/>
+      </a:defRPr>
+    </a:lvl4pPr>
+    <a:lvl5pPr marL="1828800" algn="l" defTabSz="914400" rtl="0" eaLnBrk="1" latinLnBrk="0" hangingPunct="1">
+      <a:defRPr sz="1200" kern="1200">
+        <a:solidFill>
+          <a:schemeClr val="tx1"/>
+        </a:solidFill>
+        <a:latin typeface="+mn-lt"/>
+        <a:ea typeface="+mn-ea"/>
+        <a:cs typeface="+mn-cs"/>
+      </a:defRPr>
+    </a:lvl5pPr>
+    <a:lvl6pPr marL="2286000" algn="l" defTabSz="914400" rtl="0" eaLnBrk="1" latinLnBrk="0" hangingPunct="1">
+      <a:defRPr sz="1200" kern="1200">
+        <a:solidFill>
+          <a:schemeClr val="tx1"/>
+        </a:solidFill>
+        <a:latin typeface="+mn-lt"/>
+        <a:ea typeface="+mn-ea"/>
+        <a:cs typeface="+mn-cs"/>
+      </a:defRPr>
+    </a:lvl6pPr>
+    <a:lvl7pPr marL="2743200" algn="l" defTabSz="914400" rtl="0" eaLnBrk="1" latinLnBrk="0" hangingPunct="1">
+      <a:defRPr sz="1200" kern="1200">
+        <a:solidFill>
+          <a:schemeClr val="tx1"/>
+        </a:solidFill>
+        <a:latin typeface="+mn-lt"/>
+        <a:ea typeface="+mn-ea"/>
+        <a:cs typeface="+mn-cs"/>
+      </a:defRPr>
+    </a:lvl7pPr>
+    <a:lvl8pPr marL="3200400" algn="l" defTabSz="914400" rtl="0" eaLnBrk="1" latinLnBrk="0" hangingPunct="1">
+      <a:defRPr sz="1200" kern="1200">
+        <a:solidFill>
+          <a:schemeClr val="tx1"/>
+        </a:solidFill>
+        <a:latin typeface="+mn-lt"/>
+        <a:ea typeface="+mn-ea"/>
+        <a:cs typeface="+mn-cs"/>
+      </a:defRPr>
+    </a:lvl8pPr>
+    <a:lvl9pPr marL="3657600" algn="l" defTabSz="914400" rtl="0" eaLnBrk="1" latinLnBrk="0" hangingPunct="1">
+      <a:defRPr sz="1200" kern="1200">
+        <a:solidFill>
+          <a:schemeClr val="tx1"/>
+        </a:solidFill>
+        <a:latin typeface="+mn-lt"/>
+        <a:ea typeface="+mn-ea"/>
+        <a:cs typeface="+mn-cs"/>
+      </a:defRPr>
+    </a:lvl9pPr>
+  </p:notesStyle>
+</p:notesMaster>
+</file>
+
+<file path=ppt/notesSlides/notesSlide1.xml><?xml version="1.0" encoding="utf-8"?>
+<p:notes xmlns:a="http://schemas.openxmlformats.org/drawingml/2006/main" xmlns:r="http://schemas.openxmlformats.org/officeDocument/2006/relationships" xmlns:p="http://schemas.openxmlformats.org/presentationml/2006/main">
+  <p:cSld>
+    <p:spTree>
+      <p:nvGrpSpPr>
+        <p:cNvPr id="1" name=""/>
+        <p:cNvGrpSpPr/>
+        <p:nvPr/>
+      </p:nvGrpSpPr>
+      <p:grpSpPr>
+        <a:xfrm>
+          <a:off x="0" y="0"/>
+          <a:ext cx="0" cy="0"/>
+          <a:chOff x="0" y="0"/>
+          <a:chExt cx="0" cy="0"/>
+        </a:xfrm>
+      </p:grpSpPr>
+      <p:sp>
+        <p:nvSpPr>
+          <p:cNvPr id="2" name="Slide Image Placeholder 1"/>
+          <p:cNvSpPr>
+            <a:spLocks noGrp="1" noRot="1" noChangeAspect="1"/>
+          </p:cNvSpPr>
+          <p:nvPr>
+            <p:ph type="sldImg"/>
+          </p:nvPr>
+        </p:nvSpPr>
+        <p:spPr/>
+      </p:sp>
+      <p:sp>
+        <p:nvSpPr>
+          <p:cNvPr id="3" name="Notes Placeholder 2"/>
+          <p:cNvSpPr>
+            <a:spLocks noGrp="1"/>
+          </p:cNvSpPr>
+          <p:nvPr>
+            <p:ph type="body" idx="1"/>
+          </p:nvPr>
+        </p:nvSpPr>
+        <p:spPr/>
+        <p:txBody>
+          <a:bodyPr/>
+          <a:lstStyle/>
+          <a:p>
+            <a:r>
+              <a:rPr lang="en-GB" dirty="0" smtClean="0"/>
+              <a:t>Geeks without</a:t>
+            </a:r>
+            <a:r>
+              <a:rPr lang="en-GB" baseline="0" dirty="0" smtClean="0"/>
+              <a:t> bounds is an organisation which helps charities develop open source solutions to their projects. </a:t>
+            </a:r>
+          </a:p>
+          <a:p>
+            <a:r>
+              <a:rPr lang="en-GB" baseline="0" dirty="0" smtClean="0"/>
+              <a:t>They have a 6 month mentorship programme, where they help the charity learn how to develop their projects from prototype to a sustainable product which they can then use with their work. </a:t>
+            </a:r>
+          </a:p>
+          <a:p>
+            <a:r>
+              <a:rPr lang="en-GB" baseline="0" dirty="0" smtClean="0"/>
+              <a:t>Charities also get some help with fundraising if need be in order to help fun the mentorship programme. </a:t>
+            </a:r>
+          </a:p>
+          <a:p>
+            <a:endParaRPr lang="en-GB" baseline="0" dirty="0" smtClean="0"/>
+          </a:p>
+          <a:p>
+            <a:r>
+              <a:rPr lang="en-GB" baseline="0" dirty="0" smtClean="0"/>
+              <a:t>The honey business is highly profitable, the prices are close to those of oil and demand is ever increasing. Thankfully however, they are also cheap to set up and therefore they help many people become self employed and then go on to help their communities by providing work and helping sustain the local environment. </a:t>
+            </a:r>
+          </a:p>
+          <a:p>
+            <a:endParaRPr lang="en-GB" baseline="0" dirty="0" smtClean="0"/>
+          </a:p>
+          <a:p>
+            <a:r>
+              <a:rPr lang="en-GB" baseline="0" dirty="0" smtClean="0"/>
+              <a:t>Additionally however, there is the issue that the worldwide bee population is also decreasing, so there is a serious issue that without these little pollinators we might not have any more flowers, fruits and some vegetables, and since we eat fruit and veg that might be a serious issue </a:t>
+            </a:r>
+            <a:r>
+              <a:rPr lang="en-GB" baseline="0" smtClean="0"/>
+              <a:t>in times to come. </a:t>
+            </a:r>
+            <a:endParaRPr lang="en-GB" baseline="0" dirty="0" smtClean="0"/>
+          </a:p>
+          <a:p>
+            <a:endParaRPr lang="en-GB" dirty="0"/>
+          </a:p>
+        </p:txBody>
+      </p:sp>
+      <p:sp>
+        <p:nvSpPr>
+          <p:cNvPr id="4" name="Slide Number Placeholder 3"/>
+          <p:cNvSpPr>
+            <a:spLocks noGrp="1"/>
+          </p:cNvSpPr>
+          <p:nvPr>
+            <p:ph type="sldNum" sz="quarter" idx="10"/>
+          </p:nvPr>
+        </p:nvSpPr>
+        <p:spPr/>
+        <p:txBody>
+          <a:bodyPr/>
+          <a:lstStyle/>
+          <a:p>
+            <a:fld id="{0F0C9DE4-B42D-4D6E-AC3E-80271984D5FD}" type="slidenum">
+              <a:rPr lang="en-GB" smtClean="0"/>
+              <a:t>2</a:t>
+            </a:fld>
+            <a:endParaRPr lang="en-GB"/>
+          </a:p>
+        </p:txBody>
+      </p:sp>
+    </p:spTree>
+    <p:extLst>
+      <p:ext uri="{BB962C8B-B14F-4D97-AF65-F5344CB8AC3E}">
+        <p14:creationId xmlns:p14="http://schemas.microsoft.com/office/powerpoint/2010/main" val="1621012855"/>
+      </p:ext>
+    </p:extLst>
+  </p:cSld>
+  <p:clrMapOvr>
+    <a:masterClrMapping/>
+  </p:clrMapOvr>
+</p:notes>
 </file>
 
 <file path=ppt/slideLayouts/slideLayout1.xml><?xml version="1.0" encoding="utf-8"?>
@@ -5837,7 +6320,7 @@
         <p:spPr>
           <a:xfrm>
             <a:off x="1261872" y="758952"/>
-            <a:ext cx="9418320" cy="3097056"/>
+            <a:ext cx="9418320" cy="2941780"/>
           </a:xfrm>
         </p:spPr>
         <p:txBody>
@@ -5865,8 +6348,8 @@
         </p:nvSpPr>
         <p:spPr>
           <a:xfrm>
-            <a:off x="1261872" y="3769743"/>
-            <a:ext cx="9418320" cy="2722497"/>
+            <a:off x="1261872" y="3614469"/>
+            <a:ext cx="9418320" cy="2877772"/>
           </a:xfrm>
         </p:spPr>
         <p:txBody>
@@ -5877,9 +6360,21 @@
           <a:p>
             <a:pPr algn="ctr"/>
             <a:r>
-              <a:rPr lang="en-GB" sz="2400" dirty="0" smtClean="0"/>
+              <a:rPr lang="en-GB" sz="2800" dirty="0" smtClean="0"/>
               <a:t>Team 1</a:t>
             </a:r>
+          </a:p>
+          <a:p>
+            <a:pPr algn="ctr"/>
+            <a:r>
+              <a:rPr lang="en-GB" sz="2000" dirty="0" smtClean="0"/>
+              <a:t>Adam, Baldeep, Bogdan, Ross, </a:t>
+            </a:r>
+            <a:r>
+              <a:rPr lang="en-GB" sz="2000" dirty="0" err="1" smtClean="0"/>
+              <a:t>Vitalij</a:t>
+            </a:r>
+            <a:endParaRPr lang="en-GB" sz="2000" dirty="0" smtClean="0"/>
           </a:p>
         </p:txBody>
       </p:sp>
@@ -5899,7 +6394,7 @@
         </p:blipFill>
         <p:spPr>
           <a:xfrm>
-            <a:off x="4514375" y="4328734"/>
+            <a:off x="4514375" y="4772700"/>
             <a:ext cx="2913313" cy="716581"/>
           </a:xfrm>
           <a:prstGeom prst="rect">
@@ -5911,6 +6406,166 @@
     <p:extLst>
       <p:ext uri="{BB962C8B-B14F-4D97-AF65-F5344CB8AC3E}">
         <p14:creationId xmlns:p14="http://schemas.microsoft.com/office/powerpoint/2010/main" val="3782208619"/>
+      </p:ext>
+    </p:extLst>
+  </p:cSld>
+  <p:clrMapOvr>
+    <a:masterClrMapping/>
+  </p:clrMapOvr>
+</p:sld>
+</file>
+
+<file path=ppt/slides/slide2.xml><?xml version="1.0" encoding="utf-8"?>
+<p:sld xmlns:a="http://schemas.openxmlformats.org/drawingml/2006/main" xmlns:r="http://schemas.openxmlformats.org/officeDocument/2006/relationships" xmlns:p="http://schemas.openxmlformats.org/presentationml/2006/main">
+  <p:cSld>
+    <p:spTree>
+      <p:nvGrpSpPr>
+        <p:cNvPr id="1" name=""/>
+        <p:cNvGrpSpPr/>
+        <p:nvPr/>
+      </p:nvGrpSpPr>
+      <p:grpSpPr>
+        <a:xfrm>
+          <a:off x="0" y="0"/>
+          <a:ext cx="0" cy="0"/>
+          <a:chOff x="0" y="0"/>
+          <a:chExt cx="0" cy="0"/>
+        </a:xfrm>
+      </p:grpSpPr>
+      <p:sp>
+        <p:nvSpPr>
+          <p:cNvPr id="2" name="Title 1"/>
+          <p:cNvSpPr>
+            <a:spLocks noGrp="1"/>
+          </p:cNvSpPr>
+          <p:nvPr>
+            <p:ph type="title"/>
+          </p:nvPr>
+        </p:nvSpPr>
+        <p:spPr>
+          <a:xfrm>
+            <a:off x="677335" y="609600"/>
+            <a:ext cx="8596668" cy="1012166"/>
+          </a:xfrm>
+        </p:spPr>
+        <p:txBody>
+          <a:bodyPr/>
+          <a:lstStyle/>
+          <a:p>
+            <a:r>
+              <a:rPr lang="en-GB" dirty="0" smtClean="0"/>
+              <a:t>GWOB &amp; Apiaries in </a:t>
+            </a:r>
+            <a:r>
+              <a:rPr lang="en-GB" dirty="0"/>
+              <a:t>A</a:t>
+            </a:r>
+            <a:r>
+              <a:rPr lang="en-GB" dirty="0" smtClean="0"/>
+              <a:t>frica</a:t>
+            </a:r>
+            <a:endParaRPr lang="en-GB" dirty="0"/>
+          </a:p>
+        </p:txBody>
+      </p:sp>
+      <p:sp>
+        <p:nvSpPr>
+          <p:cNvPr id="3" name="Text Placeholder 2"/>
+          <p:cNvSpPr>
+            <a:spLocks noGrp="1"/>
+          </p:cNvSpPr>
+          <p:nvPr>
+            <p:ph type="body" idx="1"/>
+          </p:nvPr>
+        </p:nvSpPr>
+        <p:spPr>
+          <a:xfrm>
+            <a:off x="677335" y="1733909"/>
+            <a:ext cx="8596668" cy="4307453"/>
+          </a:xfrm>
+        </p:spPr>
+        <p:txBody>
+          <a:bodyPr>
+            <a:normAutofit/>
+          </a:bodyPr>
+          <a:lstStyle/>
+          <a:p>
+            <a:pPr marL="285750" indent="-285750">
+              <a:buFont typeface="Arial" panose="020B0604020202020204" pitchFamily="34" charset="0"/>
+              <a:buChar char="•"/>
+            </a:pPr>
+            <a:r>
+              <a:rPr lang="en-GB" sz="2400" dirty="0" smtClean="0"/>
+              <a:t>Geeks Without Bounds</a:t>
+            </a:r>
+          </a:p>
+          <a:p>
+            <a:pPr marL="285750" indent="-285750">
+              <a:buFont typeface="Arial" panose="020B0604020202020204" pitchFamily="34" charset="0"/>
+              <a:buChar char="•"/>
+            </a:pPr>
+            <a:r>
+              <a:rPr lang="en-GB" sz="2400" dirty="0" smtClean="0"/>
+              <a:t>Accelerator Programme</a:t>
+            </a:r>
+          </a:p>
+          <a:p>
+            <a:pPr marL="285750" indent="-285750">
+              <a:buFont typeface="Arial" panose="020B0604020202020204" pitchFamily="34" charset="0"/>
+              <a:buChar char="•"/>
+            </a:pPr>
+            <a:r>
+              <a:rPr lang="en-GB" sz="2400" dirty="0" smtClean="0"/>
+              <a:t>Apiary Business</a:t>
+            </a:r>
+          </a:p>
+          <a:p>
+            <a:pPr marL="742950" lvl="1" indent="-285750">
+              <a:buFont typeface="Arial" panose="020B0604020202020204" pitchFamily="34" charset="0"/>
+              <a:buChar char="•"/>
+            </a:pPr>
+            <a:r>
+              <a:rPr lang="en-GB" sz="2400" dirty="0" smtClean="0"/>
+              <a:t>High Profits</a:t>
+            </a:r>
+          </a:p>
+          <a:p>
+            <a:pPr marL="742950" lvl="1" indent="-285750">
+              <a:buFont typeface="Arial" panose="020B0604020202020204" pitchFamily="34" charset="0"/>
+              <a:buChar char="•"/>
+            </a:pPr>
+            <a:r>
+              <a:rPr lang="en-GB" sz="2400" dirty="0" smtClean="0"/>
+              <a:t>Cheap to set up</a:t>
+            </a:r>
+            <a:endParaRPr lang="en-GB" sz="2400" dirty="0"/>
+          </a:p>
+          <a:p>
+            <a:pPr marL="742950" lvl="1" indent="-285750">
+              <a:buFont typeface="Arial" panose="020B0604020202020204" pitchFamily="34" charset="0"/>
+              <a:buChar char="•"/>
+            </a:pPr>
+            <a:r>
+              <a:rPr lang="en-GB" sz="2400" dirty="0" smtClean="0"/>
+              <a:t>Helps communities</a:t>
+            </a:r>
+          </a:p>
+          <a:p>
+            <a:pPr marL="285750" indent="-285750">
+              <a:buFont typeface="Arial" panose="020B0604020202020204" pitchFamily="34" charset="0"/>
+              <a:buChar char="•"/>
+            </a:pPr>
+            <a:r>
+              <a:rPr lang="en-GB" sz="2400" dirty="0" smtClean="0"/>
+              <a:t>We need bees!</a:t>
+            </a:r>
+          </a:p>
+        </p:txBody>
+      </p:sp>
+    </p:spTree>
+    <p:extLst>
+      <p:ext uri="{BB962C8B-B14F-4D97-AF65-F5344CB8AC3E}">
+        <p14:creationId xmlns:p14="http://schemas.microsoft.com/office/powerpoint/2010/main" val="3400447629"/>
       </p:ext>
     </p:extLst>
   </p:cSld>
@@ -6175,4 +6830,265 @@
     </a:ext>
   </a:extLst>
 </a:theme>
+</file>
+
+<file path=ppt/theme/theme2.xml><?xml version="1.0" encoding="utf-8"?>
+<a:theme xmlns:a="http://schemas.openxmlformats.org/drawingml/2006/main" name="Office Theme">
+  <a:themeElements>
+    <a:clrScheme name="Office">
+      <a:dk1>
+        <a:sysClr val="windowText" lastClr="000000"/>
+      </a:dk1>
+      <a:lt1>
+        <a:sysClr val="window" lastClr="FFFFFF"/>
+      </a:lt1>
+      <a:dk2>
+        <a:srgbClr val="44546A"/>
+      </a:dk2>
+      <a:lt2>
+        <a:srgbClr val="E7E6E6"/>
+      </a:lt2>
+      <a:accent1>
+        <a:srgbClr val="5B9BD5"/>
+      </a:accent1>
+      <a:accent2>
+        <a:srgbClr val="ED7D31"/>
+      </a:accent2>
+      <a:accent3>
+        <a:srgbClr val="A5A5A5"/>
+      </a:accent3>
+      <a:accent4>
+        <a:srgbClr val="FFC000"/>
+      </a:accent4>
+      <a:accent5>
+        <a:srgbClr val="4472C4"/>
+      </a:accent5>
+      <a:accent6>
+        <a:srgbClr val="70AD47"/>
+      </a:accent6>
+      <a:hlink>
+        <a:srgbClr val="0563C1"/>
+      </a:hlink>
+      <a:folHlink>
+        <a:srgbClr val="954F72"/>
+      </a:folHlink>
+    </a:clrScheme>
+    <a:fontScheme name="Office">
+      <a:majorFont>
+        <a:latin typeface="Calibri Light" panose="020F0302020204030204"/>
+        <a:ea typeface=""/>
+        <a:cs typeface=""/>
+        <a:font script="Jpan" typeface="ＭＳ Ｐゴシック"/>
+        <a:font script="Hang" typeface="맑은 고딕"/>
+        <a:font script="Hans" typeface="宋体"/>
+        <a:font script="Hant" typeface="新細明體"/>
+        <a:font script="Arab" typeface="Times New Roman"/>
+        <a:font script="Hebr" typeface="Times New Roman"/>
+        <a:font script="Thai" typeface="Angsana New"/>
+        <a:font script="Ethi" typeface="Nyala"/>
+        <a:font script="Beng" typeface="Vrinda"/>
+        <a:font script="Gujr" typeface="Shruti"/>
+        <a:font script="Khmr" typeface="MoolBoran"/>
+        <a:font script="Knda" typeface="Tunga"/>
+        <a:font script="Guru" typeface="Raavi"/>
+        <a:font script="Cans" typeface="Euphemia"/>
+        <a:font script="Cher" typeface="Plantagenet Cherokee"/>
+        <a:font script="Yiii" typeface="Microsoft Yi Baiti"/>
+        <a:font script="Tibt" typeface="Microsoft Himalaya"/>
+        <a:font script="Thaa" typeface="MV Boli"/>
+        <a:font script="Deva" typeface="Mangal"/>
+        <a:font script="Telu" typeface="Gautami"/>
+        <a:font script="Taml" typeface="Latha"/>
+        <a:font script="Syrc" typeface="Estrangelo Edessa"/>
+        <a:font script="Orya" typeface="Kalinga"/>
+        <a:font script="Mlym" typeface="Kartika"/>
+        <a:font script="Laoo" typeface="DokChampa"/>
+        <a:font script="Sinh" typeface="Iskoola Pota"/>
+        <a:font script="Mong" typeface="Mongolian Baiti"/>
+        <a:font script="Viet" typeface="Times New Roman"/>
+        <a:font script="Uigh" typeface="Microsoft Uighur"/>
+        <a:font script="Geor" typeface="Sylfaen"/>
+      </a:majorFont>
+      <a:minorFont>
+        <a:latin typeface="Calibri" panose="020F0502020204030204"/>
+        <a:ea typeface=""/>
+        <a:cs typeface=""/>
+        <a:font script="Jpan" typeface="ＭＳ Ｐゴシック"/>
+        <a:font script="Hang" typeface="맑은 고딕"/>
+        <a:font script="Hans" typeface="宋体"/>
+        <a:font script="Hant" typeface="新細明體"/>
+        <a:font script="Arab" typeface="Arial"/>
+        <a:font script="Hebr" typeface="Arial"/>
+        <a:font script="Thai" typeface="Cordia New"/>
+        <a:font script="Ethi" typeface="Nyala"/>
+        <a:font script="Beng" typeface="Vrinda"/>
+        <a:font script="Gujr" typeface="Shruti"/>
+        <a:font script="Khmr" typeface="DaunPenh"/>
+        <a:font script="Knda" typeface="Tunga"/>
+        <a:font script="Guru" typeface="Raavi"/>
+        <a:font script="Cans" typeface="Euphemia"/>
+        <a:font script="Cher" typeface="Plantagenet Cherokee"/>
+        <a:font script="Yiii" typeface="Microsoft Yi Baiti"/>
+        <a:font script="Tibt" typeface="Microsoft Himalaya"/>
+        <a:font script="Thaa" typeface="MV Boli"/>
+        <a:font script="Deva" typeface="Mangal"/>
+        <a:font script="Telu" typeface="Gautami"/>
+        <a:font script="Taml" typeface="Latha"/>
+        <a:font script="Syrc" typeface="Estrangelo Edessa"/>
+        <a:font script="Orya" typeface="Kalinga"/>
+        <a:font script="Mlym" typeface="Kartika"/>
+        <a:font script="Laoo" typeface="DokChampa"/>
+        <a:font script="Sinh" typeface="Iskoola Pota"/>
+        <a:font script="Mong" typeface="Mongolian Baiti"/>
+        <a:font script="Viet" typeface="Arial"/>
+        <a:font script="Uigh" typeface="Microsoft Uighur"/>
+        <a:font script="Geor" typeface="Sylfaen"/>
+      </a:minorFont>
+    </a:fontScheme>
+    <a:fmtScheme name="Office">
+      <a:fillStyleLst>
+        <a:solidFill>
+          <a:schemeClr val="phClr"/>
+        </a:solidFill>
+        <a:gradFill rotWithShape="1">
+          <a:gsLst>
+            <a:gs pos="0">
+              <a:schemeClr val="phClr">
+                <a:lumMod val="110000"/>
+                <a:satMod val="105000"/>
+                <a:tint val="67000"/>
+              </a:schemeClr>
+            </a:gs>
+            <a:gs pos="50000">
+              <a:schemeClr val="phClr">
+                <a:lumMod val="105000"/>
+                <a:satMod val="103000"/>
+                <a:tint val="73000"/>
+              </a:schemeClr>
+            </a:gs>
+            <a:gs pos="100000">
+              <a:schemeClr val="phClr">
+                <a:lumMod val="105000"/>
+                <a:satMod val="109000"/>
+                <a:tint val="81000"/>
+              </a:schemeClr>
+            </a:gs>
+          </a:gsLst>
+          <a:lin ang="5400000" scaled="0"/>
+        </a:gradFill>
+        <a:gradFill rotWithShape="1">
+          <a:gsLst>
+            <a:gs pos="0">
+              <a:schemeClr val="phClr">
+                <a:satMod val="103000"/>
+                <a:lumMod val="102000"/>
+                <a:tint val="94000"/>
+              </a:schemeClr>
+            </a:gs>
+            <a:gs pos="50000">
+              <a:schemeClr val="phClr">
+                <a:satMod val="110000"/>
+                <a:lumMod val="100000"/>
+                <a:shade val="100000"/>
+              </a:schemeClr>
+            </a:gs>
+            <a:gs pos="100000">
+              <a:schemeClr val="phClr">
+                <a:lumMod val="99000"/>
+                <a:satMod val="120000"/>
+                <a:shade val="78000"/>
+              </a:schemeClr>
+            </a:gs>
+          </a:gsLst>
+          <a:lin ang="5400000" scaled="0"/>
+        </a:gradFill>
+      </a:fillStyleLst>
+      <a:lnStyleLst>
+        <a:ln w="6350" cap="flat" cmpd="sng" algn="ctr">
+          <a:solidFill>
+            <a:schemeClr val="phClr"/>
+          </a:solidFill>
+          <a:prstDash val="solid"/>
+          <a:miter lim="800000"/>
+        </a:ln>
+        <a:ln w="12700" cap="flat" cmpd="sng" algn="ctr">
+          <a:solidFill>
+            <a:schemeClr val="phClr"/>
+          </a:solidFill>
+          <a:prstDash val="solid"/>
+          <a:miter lim="800000"/>
+        </a:ln>
+        <a:ln w="19050" cap="flat" cmpd="sng" algn="ctr">
+          <a:solidFill>
+            <a:schemeClr val="phClr"/>
+          </a:solidFill>
+          <a:prstDash val="solid"/>
+          <a:miter lim="800000"/>
+        </a:ln>
+      </a:lnStyleLst>
+      <a:effectStyleLst>
+        <a:effectStyle>
+          <a:effectLst/>
+        </a:effectStyle>
+        <a:effectStyle>
+          <a:effectLst/>
+        </a:effectStyle>
+        <a:effectStyle>
+          <a:effectLst>
+            <a:outerShdw blurRad="57150" dist="19050" dir="5400000" algn="ctr" rotWithShape="0">
+              <a:srgbClr val="000000">
+                <a:alpha val="63000"/>
+              </a:srgbClr>
+            </a:outerShdw>
+          </a:effectLst>
+        </a:effectStyle>
+      </a:effectStyleLst>
+      <a:bgFillStyleLst>
+        <a:solidFill>
+          <a:schemeClr val="phClr"/>
+        </a:solidFill>
+        <a:solidFill>
+          <a:schemeClr val="phClr">
+            <a:tint val="95000"/>
+            <a:satMod val="170000"/>
+          </a:schemeClr>
+        </a:solidFill>
+        <a:gradFill rotWithShape="1">
+          <a:gsLst>
+            <a:gs pos="0">
+              <a:schemeClr val="phClr">
+                <a:tint val="93000"/>
+                <a:satMod val="150000"/>
+                <a:shade val="98000"/>
+                <a:lumMod val="102000"/>
+              </a:schemeClr>
+            </a:gs>
+            <a:gs pos="50000">
+              <a:schemeClr val="phClr">
+                <a:tint val="98000"/>
+                <a:satMod val="130000"/>
+                <a:shade val="90000"/>
+                <a:lumMod val="103000"/>
+              </a:schemeClr>
+            </a:gs>
+            <a:gs pos="100000">
+              <a:schemeClr val="phClr">
+                <a:shade val="63000"/>
+                <a:satMod val="120000"/>
+              </a:schemeClr>
+            </a:gs>
+          </a:gsLst>
+          <a:lin ang="5400000" scaled="0"/>
+        </a:gradFill>
+      </a:bgFillStyleLst>
+    </a:fmtScheme>
+  </a:themeElements>
+  <a:objectDefaults/>
+  <a:extraClrSchemeLst/>
+  <a:extLst>
+    <a:ext uri="{05A4C25C-085E-4340-85A3-A5531E510DB2}">
+      <thm15:themeFamily xmlns:thm15="http://schemas.microsoft.com/office/thememl/2012/main" name="Office Theme" id="{62F939B6-93AF-4DB8-9C6B-D6C7DFDC589F}" vid="{4A3C46E8-61CC-4603-A589-7422A47A8E4A}"/>
+    </a:ext>
+  </a:extLst>
+</a:theme>
 </file>
</xml_diff>